<commit_message>
I have changed last page
</commit_message>
<xml_diff>
--- a/Project Idea Presentation.pptx
+++ b/Project Idea Presentation.pptx
@@ -5,7 +5,7 @@
     <p:sldMasterId id="2147483648" r:id="rId1"/>
   </p:sldMasterIdLst>
   <p:notesMasterIdLst>
-    <p:notesMasterId r:id="rId28"/>
+    <p:notesMasterId r:id="rId29"/>
   </p:notesMasterIdLst>
   <p:sldIdLst>
     <p:sldId id="256" r:id="rId2"/>
@@ -34,6 +34,7 @@
     <p:sldId id="288" r:id="rId25"/>
     <p:sldId id="292" r:id="rId26"/>
     <p:sldId id="287" r:id="rId27"/>
+    <p:sldId id="294" r:id="rId28"/>
   </p:sldIdLst>
   <p:sldSz cx="9144000" cy="6858000" type="screen4x3"/>
   <p:notesSz cx="7315200" cy="9601200"/>
@@ -282,7 +283,7 @@
       </p15:sldGuideLst>
     </p:ext>
     <p:ext uri="http://customooxmlschemas.google.com/">
-      <go:slidesCustomData xmlns="" xmlns:mc="http://schemas.openxmlformats.org/markup-compatibility/2006" xmlns:mv="urn:schemas-microsoft-com:mac:vml" xmlns:c="http://schemas.openxmlformats.org/drawingml/2006/chart" xmlns:dgm="http://schemas.openxmlformats.org/drawingml/2006/diagram" xmlns:o="urn:schemas-microsoft-com:office:office" xmlns:v="urn:schemas-microsoft-com:vml" xmlns:pvml="urn:schemas-microsoft-com:office:powerpoint" xmlns:com="http://schemas.openxmlformats.org/drawingml/2006/compatibility" xmlns:p14="http://schemas.microsoft.com/office/powerpoint/2010/main" xmlns:p15="http://schemas.microsoft.com/office/powerpoint/2012/main" xmlns:ahyp="http://schemas.microsoft.com/office/drawing/2018/hyperlinkcolor" xmlns:go="http://customooxmlschemas.google.com/" r:id="rId34" roundtripDataSignature="AMtx7mgqso+muD7qxSKyk66oXGt+27nMBQ=="/>
+      <go:slidesCustomData xmlns:go="http://customooxmlschemas.google.com/" xmlns:ahyp="http://schemas.microsoft.com/office/drawing/2018/hyperlinkcolor" xmlns:p15="http://schemas.microsoft.com/office/powerpoint/2012/main" xmlns:p14="http://schemas.microsoft.com/office/powerpoint/2010/main" xmlns:com="http://schemas.openxmlformats.org/drawingml/2006/compatibility" xmlns:pvml="urn:schemas-microsoft-com:office:powerpoint" xmlns:v="urn:schemas-microsoft-com:vml" xmlns:o="urn:schemas-microsoft-com:office:office" xmlns:dgm="http://schemas.openxmlformats.org/drawingml/2006/diagram" xmlns:c="http://schemas.openxmlformats.org/drawingml/2006/chart" xmlns:mv="urn:schemas-microsoft-com:mac:vml" xmlns:mc="http://schemas.openxmlformats.org/markup-compatibility/2006" xmlns="" r:id="rId34" roundtripDataSignature="AMtx7mgqso+muD7qxSKyk66oXGt+27nMBQ=="/>
     </p:ext>
   </p:extLst>
 </p:presentation>
@@ -15828,42 +15829,42 @@
                 <a:gridCol w="4050432">
                   <a:extLst>
                     <a:ext uri="{9D8B030D-6E8A-4147-A177-3AD203B41FA5}">
-                      <a16:colId xmlns:a16="http://schemas.microsoft.com/office/drawing/2014/main" val="3698163113"/>
+                      <a16:colId xmlns:a16="http://schemas.microsoft.com/office/drawing/2014/main" xmlns="" val="3698163113"/>
                     </a:ext>
                   </a:extLst>
                 </a:gridCol>
                 <a:gridCol w="1031777">
                   <a:extLst>
                     <a:ext uri="{9D8B030D-6E8A-4147-A177-3AD203B41FA5}">
-                      <a16:colId xmlns:a16="http://schemas.microsoft.com/office/drawing/2014/main" val="436700546"/>
+                      <a16:colId xmlns:a16="http://schemas.microsoft.com/office/drawing/2014/main" xmlns="" val="436700546"/>
                     </a:ext>
                   </a:extLst>
                 </a:gridCol>
                 <a:gridCol w="1031777">
                   <a:extLst>
                     <a:ext uri="{9D8B030D-6E8A-4147-A177-3AD203B41FA5}">
-                      <a16:colId xmlns:a16="http://schemas.microsoft.com/office/drawing/2014/main" val="2815801045"/>
+                      <a16:colId xmlns:a16="http://schemas.microsoft.com/office/drawing/2014/main" xmlns="" val="2815801045"/>
                     </a:ext>
                   </a:extLst>
                 </a:gridCol>
                 <a:gridCol w="1031777">
                   <a:extLst>
                     <a:ext uri="{9D8B030D-6E8A-4147-A177-3AD203B41FA5}">
-                      <a16:colId xmlns:a16="http://schemas.microsoft.com/office/drawing/2014/main" val="2579666148"/>
+                      <a16:colId xmlns:a16="http://schemas.microsoft.com/office/drawing/2014/main" xmlns="" val="2579666148"/>
                     </a:ext>
                   </a:extLst>
                 </a:gridCol>
                 <a:gridCol w="1031777">
                   <a:extLst>
                     <a:ext uri="{9D8B030D-6E8A-4147-A177-3AD203B41FA5}">
-                      <a16:colId xmlns:a16="http://schemas.microsoft.com/office/drawing/2014/main" val="117727124"/>
+                      <a16:colId xmlns:a16="http://schemas.microsoft.com/office/drawing/2014/main" xmlns="" val="117727124"/>
                     </a:ext>
                   </a:extLst>
                 </a:gridCol>
                 <a:gridCol w="1031777">
                   <a:extLst>
                     <a:ext uri="{9D8B030D-6E8A-4147-A177-3AD203B41FA5}">
-                      <a16:colId xmlns:a16="http://schemas.microsoft.com/office/drawing/2014/main" val="926774753"/>
+                      <a16:colId xmlns:a16="http://schemas.microsoft.com/office/drawing/2014/main" xmlns="" val="926774753"/>
                     </a:ext>
                   </a:extLst>
                 </a:gridCol>
@@ -16213,7 +16214,7 @@
                 </a:tc>
                 <a:extLst>
                   <a:ext uri="{0D108BD9-81ED-4DB2-BD59-A6C34878D82A}">
-                    <a16:rowId xmlns:a16="http://schemas.microsoft.com/office/drawing/2014/main" val="1475585504"/>
+                    <a16:rowId xmlns:a16="http://schemas.microsoft.com/office/drawing/2014/main" xmlns="" val="1475585504"/>
                   </a:ext>
                 </a:extLst>
               </a:tr>
@@ -16557,7 +16558,7 @@
                 </a:tc>
                 <a:extLst>
                   <a:ext uri="{0D108BD9-81ED-4DB2-BD59-A6C34878D82A}">
-                    <a16:rowId xmlns:a16="http://schemas.microsoft.com/office/drawing/2014/main" val="1452463496"/>
+                    <a16:rowId xmlns:a16="http://schemas.microsoft.com/office/drawing/2014/main" xmlns="" val="1452463496"/>
                   </a:ext>
                 </a:extLst>
               </a:tr>
@@ -16901,7 +16902,7 @@
                 </a:tc>
                 <a:extLst>
                   <a:ext uri="{0D108BD9-81ED-4DB2-BD59-A6C34878D82A}">
-                    <a16:rowId xmlns:a16="http://schemas.microsoft.com/office/drawing/2014/main" val="3451393938"/>
+                    <a16:rowId xmlns:a16="http://schemas.microsoft.com/office/drawing/2014/main" xmlns="" val="3451393938"/>
                   </a:ext>
                 </a:extLst>
               </a:tr>
@@ -17245,7 +17246,7 @@
                 </a:tc>
                 <a:extLst>
                   <a:ext uri="{0D108BD9-81ED-4DB2-BD59-A6C34878D82A}">
-                    <a16:rowId xmlns:a16="http://schemas.microsoft.com/office/drawing/2014/main" val="1227875321"/>
+                    <a16:rowId xmlns:a16="http://schemas.microsoft.com/office/drawing/2014/main" xmlns="" val="1227875321"/>
                   </a:ext>
                 </a:extLst>
               </a:tr>
@@ -19130,7 +19131,7 @@
           <p:cNvPr id="2" name="Title 1">
             <a:extLst>
               <a:ext uri="{FF2B5EF4-FFF2-40B4-BE49-F238E27FC236}">
-                <a16:creationId xmlns:a16="http://schemas.microsoft.com/office/drawing/2014/main" id="{124AB656-07FD-415A-B297-B125A61D06A8}"/>
+                <a16:creationId xmlns:a16="http://schemas.microsoft.com/office/drawing/2014/main" xmlns="" id="{124AB656-07FD-415A-B297-B125A61D06A8}"/>
               </a:ext>
             </a:extLst>
           </p:cNvPr>
@@ -19163,7 +19164,7 @@
           <p:cNvPr id="4" name="Table 3">
             <a:extLst>
               <a:ext uri="{FF2B5EF4-FFF2-40B4-BE49-F238E27FC236}">
-                <a16:creationId xmlns:a16="http://schemas.microsoft.com/office/drawing/2014/main" id="{159A88E3-29D5-4EFE-9EA6-1BC1F8A2BEA3}"/>
+                <a16:creationId xmlns:a16="http://schemas.microsoft.com/office/drawing/2014/main" xmlns="" id="{159A88E3-29D5-4EFE-9EA6-1BC1F8A2BEA3}"/>
               </a:ext>
             </a:extLst>
           </p:cNvPr>
@@ -19190,35 +19191,35 @@
                 <a:gridCol w="1690937">
                   <a:extLst>
                     <a:ext uri="{9D8B030D-6E8A-4147-A177-3AD203B41FA5}">
-                      <a16:colId xmlns:a16="http://schemas.microsoft.com/office/drawing/2014/main" val="3892995257"/>
+                      <a16:colId xmlns:a16="http://schemas.microsoft.com/office/drawing/2014/main" xmlns="" val="3892995257"/>
                     </a:ext>
                   </a:extLst>
                 </a:gridCol>
                 <a:gridCol w="1690937">
                   <a:extLst>
                     <a:ext uri="{9D8B030D-6E8A-4147-A177-3AD203B41FA5}">
-                      <a16:colId xmlns:a16="http://schemas.microsoft.com/office/drawing/2014/main" val="719835350"/>
+                      <a16:colId xmlns:a16="http://schemas.microsoft.com/office/drawing/2014/main" xmlns="" val="719835350"/>
                     </a:ext>
                   </a:extLst>
                 </a:gridCol>
                 <a:gridCol w="1690937">
                   <a:extLst>
                     <a:ext uri="{9D8B030D-6E8A-4147-A177-3AD203B41FA5}">
-                      <a16:colId xmlns:a16="http://schemas.microsoft.com/office/drawing/2014/main" val="2818945183"/>
+                      <a16:colId xmlns:a16="http://schemas.microsoft.com/office/drawing/2014/main" xmlns="" val="2818945183"/>
                     </a:ext>
                   </a:extLst>
                 </a:gridCol>
                 <a:gridCol w="1690937">
                   <a:extLst>
                     <a:ext uri="{9D8B030D-6E8A-4147-A177-3AD203B41FA5}">
-                      <a16:colId xmlns:a16="http://schemas.microsoft.com/office/drawing/2014/main" val="2475635255"/>
+                      <a16:colId xmlns:a16="http://schemas.microsoft.com/office/drawing/2014/main" xmlns="" val="2475635255"/>
                     </a:ext>
                   </a:extLst>
                 </a:gridCol>
                 <a:gridCol w="1690937">
                   <a:extLst>
                     <a:ext uri="{9D8B030D-6E8A-4147-A177-3AD203B41FA5}">
-                      <a16:colId xmlns:a16="http://schemas.microsoft.com/office/drawing/2014/main" val="4175443368"/>
+                      <a16:colId xmlns:a16="http://schemas.microsoft.com/office/drawing/2014/main" xmlns="" val="4175443368"/>
                     </a:ext>
                   </a:extLst>
                 </a:gridCol>
@@ -19517,7 +19518,7 @@
                 </a:tc>
                 <a:extLst>
                   <a:ext uri="{0D108BD9-81ED-4DB2-BD59-A6C34878D82A}">
-                    <a16:rowId xmlns:a16="http://schemas.microsoft.com/office/drawing/2014/main" val="546297443"/>
+                    <a16:rowId xmlns:a16="http://schemas.microsoft.com/office/drawing/2014/main" xmlns="" val="546297443"/>
                   </a:ext>
                 </a:extLst>
               </a:tr>
@@ -19798,7 +19799,7 @@
                 </a:tc>
                 <a:extLst>
                   <a:ext uri="{0D108BD9-81ED-4DB2-BD59-A6C34878D82A}">
-                    <a16:rowId xmlns:a16="http://schemas.microsoft.com/office/drawing/2014/main" val="3790252801"/>
+                    <a16:rowId xmlns:a16="http://schemas.microsoft.com/office/drawing/2014/main" xmlns="" val="3790252801"/>
                   </a:ext>
                 </a:extLst>
               </a:tr>
@@ -20079,7 +20080,7 @@
                 </a:tc>
                 <a:extLst>
                   <a:ext uri="{0D108BD9-81ED-4DB2-BD59-A6C34878D82A}">
-                    <a16:rowId xmlns:a16="http://schemas.microsoft.com/office/drawing/2014/main" val="3681570746"/>
+                    <a16:rowId xmlns:a16="http://schemas.microsoft.com/office/drawing/2014/main" xmlns="" val="3681570746"/>
                   </a:ext>
                 </a:extLst>
               </a:tr>
@@ -20360,7 +20361,7 @@
                 </a:tc>
                 <a:extLst>
                   <a:ext uri="{0D108BD9-81ED-4DB2-BD59-A6C34878D82A}">
-                    <a16:rowId xmlns:a16="http://schemas.microsoft.com/office/drawing/2014/main" val="1165107487"/>
+                    <a16:rowId xmlns:a16="http://schemas.microsoft.com/office/drawing/2014/main" xmlns="" val="1165107487"/>
                   </a:ext>
                 </a:extLst>
               </a:tr>
@@ -20642,7 +20643,7 @@
                 </a:tc>
                 <a:extLst>
                   <a:ext uri="{0D108BD9-81ED-4DB2-BD59-A6C34878D82A}">
-                    <a16:rowId xmlns:a16="http://schemas.microsoft.com/office/drawing/2014/main" val="318941444"/>
+                    <a16:rowId xmlns:a16="http://schemas.microsoft.com/office/drawing/2014/main" xmlns="" val="318941444"/>
                   </a:ext>
                 </a:extLst>
               </a:tr>
@@ -20923,7 +20924,7 @@
                 </a:tc>
                 <a:extLst>
                   <a:ext uri="{0D108BD9-81ED-4DB2-BD59-A6C34878D82A}">
-                    <a16:rowId xmlns:a16="http://schemas.microsoft.com/office/drawing/2014/main" val="786054837"/>
+                    <a16:rowId xmlns:a16="http://schemas.microsoft.com/office/drawing/2014/main" xmlns="" val="786054837"/>
                   </a:ext>
                 </a:extLst>
               </a:tr>
@@ -21204,7 +21205,7 @@
                 </a:tc>
                 <a:extLst>
                   <a:ext uri="{0D108BD9-81ED-4DB2-BD59-A6C34878D82A}">
-                    <a16:rowId xmlns:a16="http://schemas.microsoft.com/office/drawing/2014/main" val="1724210688"/>
+                    <a16:rowId xmlns:a16="http://schemas.microsoft.com/office/drawing/2014/main" xmlns="" val="1724210688"/>
                   </a:ext>
                 </a:extLst>
               </a:tr>
@@ -21485,7 +21486,7 @@
                 </a:tc>
                 <a:extLst>
                   <a:ext uri="{0D108BD9-81ED-4DB2-BD59-A6C34878D82A}">
-                    <a16:rowId xmlns:a16="http://schemas.microsoft.com/office/drawing/2014/main" val="837481215"/>
+                    <a16:rowId xmlns:a16="http://schemas.microsoft.com/office/drawing/2014/main" xmlns="" val="837481215"/>
                   </a:ext>
                 </a:extLst>
               </a:tr>
@@ -21772,7 +21773,7 @@
                 </a:tc>
                 <a:extLst>
                   <a:ext uri="{0D108BD9-81ED-4DB2-BD59-A6C34878D82A}">
-                    <a16:rowId xmlns:a16="http://schemas.microsoft.com/office/drawing/2014/main" val="114709539"/>
+                    <a16:rowId xmlns:a16="http://schemas.microsoft.com/office/drawing/2014/main" xmlns="" val="114709539"/>
                   </a:ext>
                 </a:extLst>
               </a:tr>
@@ -22056,7 +22057,7 @@
                 </a:tc>
                 <a:extLst>
                   <a:ext uri="{0D108BD9-81ED-4DB2-BD59-A6C34878D82A}">
-                    <a16:rowId xmlns:a16="http://schemas.microsoft.com/office/drawing/2014/main" val="376565151"/>
+                    <a16:rowId xmlns:a16="http://schemas.microsoft.com/office/drawing/2014/main" xmlns="" val="376565151"/>
                   </a:ext>
                 </a:extLst>
               </a:tr>
@@ -22340,7 +22341,7 @@
                 </a:tc>
                 <a:extLst>
                   <a:ext uri="{0D108BD9-81ED-4DB2-BD59-A6C34878D82A}">
-                    <a16:rowId xmlns:a16="http://schemas.microsoft.com/office/drawing/2014/main" val="3993335978"/>
+                    <a16:rowId xmlns:a16="http://schemas.microsoft.com/office/drawing/2014/main" xmlns="" val="3993335978"/>
                   </a:ext>
                 </a:extLst>
               </a:tr>
@@ -22586,6 +22587,74 @@
     <p:extLst>
       <p:ext uri="{BB962C8B-B14F-4D97-AF65-F5344CB8AC3E}">
         <p14:creationId xmlns:p14="http://schemas.microsoft.com/office/powerpoint/2010/main" val="1345686867"/>
+      </p:ext>
+    </p:extLst>
+  </p:cSld>
+  <p:clrMapOvr>
+    <a:masterClrMapping/>
+  </p:clrMapOvr>
+</p:sld>
+</file>
+
+<file path=ppt/slides/slide27.xml><?xml version="1.0" encoding="utf-8"?>
+<p:sld xmlns:a="http://schemas.openxmlformats.org/drawingml/2006/main" xmlns:r="http://schemas.openxmlformats.org/officeDocument/2006/relationships" xmlns:p="http://schemas.openxmlformats.org/presentationml/2006/main">
+  <p:cSld>
+    <p:spTree>
+      <p:nvGrpSpPr>
+        <p:cNvPr id="1" name=""/>
+        <p:cNvGrpSpPr/>
+        <p:nvPr/>
+      </p:nvGrpSpPr>
+      <p:grpSpPr>
+        <a:xfrm>
+          <a:off x="0" y="0"/>
+          <a:ext cx="0" cy="0"/>
+          <a:chOff x="0" y="0"/>
+          <a:chExt cx="0" cy="0"/>
+        </a:xfrm>
+      </p:grpSpPr>
+      <p:sp>
+        <p:nvSpPr>
+          <p:cNvPr id="2" name="Title 1"/>
+          <p:cNvSpPr>
+            <a:spLocks noGrp="1"/>
+          </p:cNvSpPr>
+          <p:nvPr>
+            <p:ph type="ctrTitle"/>
+          </p:nvPr>
+        </p:nvSpPr>
+        <p:spPr/>
+        <p:txBody>
+          <a:bodyPr/>
+          <a:lstStyle/>
+          <a:p>
+            <a:endParaRPr lang="en-US"/>
+          </a:p>
+        </p:txBody>
+      </p:sp>
+      <p:sp>
+        <p:nvSpPr>
+          <p:cNvPr id="3" name="Subtitle 2"/>
+          <p:cNvSpPr>
+            <a:spLocks noGrp="1"/>
+          </p:cNvSpPr>
+          <p:nvPr>
+            <p:ph type="subTitle" idx="1"/>
+          </p:nvPr>
+        </p:nvSpPr>
+        <p:spPr/>
+        <p:txBody>
+          <a:bodyPr/>
+          <a:lstStyle/>
+          <a:p>
+            <a:endParaRPr lang="en-US"/>
+          </a:p>
+        </p:txBody>
+      </p:sp>
+    </p:spTree>
+    <p:extLst>
+      <p:ext uri="{BB962C8B-B14F-4D97-AF65-F5344CB8AC3E}">
+        <p14:creationId xmlns:p14="http://schemas.microsoft.com/office/powerpoint/2010/main" val="3320579259"/>
       </p:ext>
     </p:extLst>
   </p:cSld>

</xml_diff>